<commit_message>
last update before using data 0618
</commit_message>
<xml_diff>
--- a/pre/Presentation1.pptx
+++ b/pre/Presentation1.pptx
@@ -3434,8 +3434,12 @@
           <a:lstStyle/>
           <a:p>
             <a:r>
+              <a:rPr lang="en-US"/>
+              <a:t>Backward-AIC from all </a:t>
+            </a:r>
+            <a:r>
               <a:rPr lang="en-US" dirty="0"/>
-              <a:t>Backward-AIC all two-way interactions</a:t>
+              <a:t>two-way interactions: </a:t>
             </a:r>
           </a:p>
         </p:txBody>
@@ -4662,7 +4666,23 @@
             <a:endParaRPr lang="en-US" dirty="0"/>
           </a:p>
           <a:p>
+            <a:r>
+              <a:rPr lang="en-US" dirty="0" err="1"/>
+              <a:t>Age_gp</a:t>
+            </a:r>
+            <a:r>
+              <a:rPr lang="en-US" dirty="0"/>
+              <a:t> was used instead of age as a continuous variable</a:t>
+            </a:r>
+          </a:p>
+          <a:p>
             <a:endParaRPr lang="en-US" dirty="0"/>
+          </a:p>
+          <a:p>
+            <a:r>
+              <a:rPr lang="en-US" dirty="0"/>
+              <a:t>Surgery_4w was used in matching</a:t>
+            </a:r>
           </a:p>
         </p:txBody>
       </p:sp>

</xml_diff>

<commit_message>
updates inclusion and exclusion
</commit_message>
<xml_diff>
--- a/pre/Presentation1.pptx
+++ b/pre/Presentation1.pptx
@@ -5,7 +5,7 @@
     <p:sldMasterId id="2147483648" r:id="rId1"/>
   </p:sldMasterIdLst>
   <p:notesMasterIdLst>
-    <p:notesMasterId r:id="rId14"/>
+    <p:notesMasterId r:id="rId16"/>
   </p:notesMasterIdLst>
   <p:sldIdLst>
     <p:sldId id="256" r:id="rId2"/>
@@ -19,7 +19,9 @@
     <p:sldId id="264" r:id="rId10"/>
     <p:sldId id="265" r:id="rId11"/>
     <p:sldId id="267" r:id="rId12"/>
-    <p:sldId id="257" r:id="rId13"/>
+    <p:sldId id="268" r:id="rId13"/>
+    <p:sldId id="269" r:id="rId14"/>
+    <p:sldId id="257" r:id="rId15"/>
   </p:sldIdLst>
   <p:sldSz cx="12192000" cy="6858000"/>
   <p:notesSz cx="6858000" cy="9144000"/>
@@ -4053,12 +4055,8 @@
           <a:lstStyle/>
           <a:p>
             <a:r>
-              <a:rPr lang="en-US"/>
-              <a:t>One or two </a:t>
-            </a:r>
-            <a:r>
               <a:rPr lang="en-US" dirty="0"/>
-              <a:t>table</a:t>
+              <a:t>One or two table</a:t>
             </a:r>
           </a:p>
         </p:txBody>
@@ -4077,6 +4075,193 @@
 </file>
 
 <file path=ppt/slides/slide12.xml><?xml version="1.0" encoding="utf-8"?>
+<p:sld xmlns:a="http://schemas.openxmlformats.org/drawingml/2006/main" xmlns:r="http://schemas.openxmlformats.org/officeDocument/2006/relationships" xmlns:p="http://schemas.openxmlformats.org/presentationml/2006/main">
+  <p:cSld>
+    <p:spTree>
+      <p:nvGrpSpPr>
+        <p:cNvPr id="1" name=""/>
+        <p:cNvGrpSpPr/>
+        <p:nvPr/>
+      </p:nvGrpSpPr>
+      <p:grpSpPr>
+        <a:xfrm>
+          <a:off x="0" y="0"/>
+          <a:ext cx="0" cy="0"/>
+          <a:chOff x="0" y="0"/>
+          <a:chExt cx="0" cy="0"/>
+        </a:xfrm>
+      </p:grpSpPr>
+      <p:sp>
+        <p:nvSpPr>
+          <p:cNvPr id="2" name="Title 1">
+            <a:extLst>
+              <a:ext uri="{FF2B5EF4-FFF2-40B4-BE49-F238E27FC236}">
+                <a16:creationId xmlns:a16="http://schemas.microsoft.com/office/drawing/2014/main" id="{D0656BB8-D9C8-5442-A1D2-D74AD1B18725}"/>
+              </a:ext>
+            </a:extLst>
+          </p:cNvPr>
+          <p:cNvSpPr>
+            <a:spLocks noGrp="1"/>
+          </p:cNvSpPr>
+          <p:nvPr>
+            <p:ph type="title"/>
+          </p:nvPr>
+        </p:nvSpPr>
+        <p:spPr/>
+        <p:txBody>
+          <a:bodyPr/>
+          <a:lstStyle/>
+          <a:p>
+            <a:endParaRPr lang="en-US"/>
+          </a:p>
+        </p:txBody>
+      </p:sp>
+      <p:pic>
+        <p:nvPicPr>
+          <p:cNvPr id="4" name="Content Placeholder 3">
+            <a:extLst>
+              <a:ext uri="{FF2B5EF4-FFF2-40B4-BE49-F238E27FC236}">
+                <a16:creationId xmlns:a16="http://schemas.microsoft.com/office/drawing/2014/main" id="{D0531E94-C13B-2E47-9176-1D65ACFEF267}"/>
+              </a:ext>
+            </a:extLst>
+          </p:cNvPr>
+          <p:cNvPicPr>
+            <a:picLocks noGrp="1" noChangeAspect="1"/>
+          </p:cNvPicPr>
+          <p:nvPr>
+            <p:ph idx="1"/>
+          </p:nvPr>
+        </p:nvPicPr>
+        <p:blipFill>
+          <a:blip r:embed="rId2"/>
+          <a:stretch>
+            <a:fillRect/>
+          </a:stretch>
+        </p:blipFill>
+        <p:spPr>
+          <a:xfrm>
+            <a:off x="1744662" y="1825625"/>
+            <a:ext cx="8702676" cy="4351338"/>
+          </a:xfrm>
+          <a:prstGeom prst="rect">
+            <a:avLst/>
+          </a:prstGeom>
+        </p:spPr>
+      </p:pic>
+    </p:spTree>
+    <p:extLst>
+      <p:ext uri="{BB962C8B-B14F-4D97-AF65-F5344CB8AC3E}">
+        <p14:creationId xmlns:p14="http://schemas.microsoft.com/office/powerpoint/2010/main" val="3044612998"/>
+      </p:ext>
+    </p:extLst>
+  </p:cSld>
+  <p:clrMapOvr>
+    <a:masterClrMapping/>
+  </p:clrMapOvr>
+</p:sld>
+</file>
+
+<file path=ppt/slides/slide13.xml><?xml version="1.0" encoding="utf-8"?>
+<p:sld xmlns:a="http://schemas.openxmlformats.org/drawingml/2006/main" xmlns:r="http://schemas.openxmlformats.org/officeDocument/2006/relationships" xmlns:p="http://schemas.openxmlformats.org/presentationml/2006/main">
+  <p:cSld>
+    <p:spTree>
+      <p:nvGrpSpPr>
+        <p:cNvPr id="1" name=""/>
+        <p:cNvGrpSpPr/>
+        <p:nvPr/>
+      </p:nvGrpSpPr>
+      <p:grpSpPr>
+        <a:xfrm>
+          <a:off x="0" y="0"/>
+          <a:ext cx="0" cy="0"/>
+          <a:chOff x="0" y="0"/>
+          <a:chExt cx="0" cy="0"/>
+        </a:xfrm>
+      </p:grpSpPr>
+      <p:sp>
+        <p:nvSpPr>
+          <p:cNvPr id="2" name="Title 1">
+            <a:extLst>
+              <a:ext uri="{FF2B5EF4-FFF2-40B4-BE49-F238E27FC236}">
+                <a16:creationId xmlns:a16="http://schemas.microsoft.com/office/drawing/2014/main" id="{897C3DB2-E96C-6F47-B173-F44E52FD9781}"/>
+              </a:ext>
+            </a:extLst>
+          </p:cNvPr>
+          <p:cNvSpPr>
+            <a:spLocks noGrp="1"/>
+          </p:cNvSpPr>
+          <p:nvPr>
+            <p:ph type="title"/>
+          </p:nvPr>
+        </p:nvSpPr>
+        <p:spPr/>
+        <p:txBody>
+          <a:bodyPr/>
+          <a:lstStyle/>
+          <a:p>
+            <a:r>
+              <a:rPr lang="en-US" dirty="0"/>
+              <a:t>Check list</a:t>
+            </a:r>
+          </a:p>
+        </p:txBody>
+      </p:sp>
+      <p:sp>
+        <p:nvSpPr>
+          <p:cNvPr id="3" name="Content Placeholder 2">
+            <a:extLst>
+              <a:ext uri="{FF2B5EF4-FFF2-40B4-BE49-F238E27FC236}">
+                <a16:creationId xmlns:a16="http://schemas.microsoft.com/office/drawing/2014/main" id="{F311A1CE-4D2D-4042-98EC-B3F408E52034}"/>
+              </a:ext>
+            </a:extLst>
+          </p:cNvPr>
+          <p:cNvSpPr>
+            <a:spLocks noGrp="1"/>
+          </p:cNvSpPr>
+          <p:nvPr>
+            <p:ph idx="1"/>
+          </p:nvPr>
+        </p:nvSpPr>
+        <p:spPr/>
+        <p:txBody>
+          <a:bodyPr/>
+          <a:lstStyle/>
+          <a:p>
+            <a:r>
+              <a:rPr lang="en-US" dirty="0"/>
+              <a:t>What comorbidity will be used? Whether to use </a:t>
+            </a:r>
+            <a:r>
+              <a:rPr lang="en-US" dirty="0" err="1"/>
+              <a:t>Charlson</a:t>
+            </a:r>
+            <a:r>
+              <a:rPr lang="en-US" dirty="0"/>
+              <a:t> comorbidity index.</a:t>
+            </a:r>
+          </a:p>
+          <a:p>
+            <a:endParaRPr lang="en-US"/>
+          </a:p>
+          <a:p>
+            <a:endParaRPr lang="en-US"/>
+          </a:p>
+        </p:txBody>
+      </p:sp>
+    </p:spTree>
+    <p:extLst>
+      <p:ext uri="{BB962C8B-B14F-4D97-AF65-F5344CB8AC3E}">
+        <p14:creationId xmlns:p14="http://schemas.microsoft.com/office/powerpoint/2010/main" val="1847955115"/>
+      </p:ext>
+    </p:extLst>
+  </p:cSld>
+  <p:clrMapOvr>
+    <a:masterClrMapping/>
+  </p:clrMapOvr>
+</p:sld>
+</file>
+
+<file path=ppt/slides/slide14.xml><?xml version="1.0" encoding="utf-8"?>
 <p:sld xmlns:a="http://schemas.openxmlformats.org/drawingml/2006/main" xmlns:r="http://schemas.openxmlformats.org/officeDocument/2006/relationships" xmlns:p="http://schemas.openxmlformats.org/presentationml/2006/main">
   <p:cSld>
     <p:spTree>

</xml_diff>